<commit_message>
Commit ngày 11/7/2022 lần 1
</commit_message>
<xml_diff>
--- a/Section 11 - Tables in PowerPoint/TABLES Section (Design).pptx
+++ b/Section 11 - Tables in PowerPoint/TABLES Section (Design).pptx
@@ -5,9 +5,10 @@
     <p:sldMasterId id="2147483648" r:id="rId1"/>
   </p:sldMasterIdLst>
   <p:sldIdLst>
-    <p:sldId id="259" r:id="rId2"/>
-    <p:sldId id="272" r:id="rId3"/>
-    <p:sldId id="271" r:id="rId4"/>
+    <p:sldId id="273" r:id="rId2"/>
+    <p:sldId id="259" r:id="rId3"/>
+    <p:sldId id="272" r:id="rId4"/>
+    <p:sldId id="271" r:id="rId5"/>
   </p:sldIdLst>
   <p:sldSz cx="12192000" cy="6858000"/>
   <p:notesSz cx="6858000" cy="9144000"/>
@@ -263,7 +264,7 @@
           <a:p>
             <a:fld id="{1AB43056-9730-4112-977B-C540BEC2CAE5}" type="datetimeFigureOut">
               <a:rPr lang="pl-PL" smtClean="0"/>
-              <a:t>18.10.2021</a:t>
+              <a:t>2022-11-07</a:t>
             </a:fld>
             <a:endParaRPr lang="pl-PL"/>
           </a:p>
@@ -463,7 +464,7 @@
           <a:p>
             <a:fld id="{1AB43056-9730-4112-977B-C540BEC2CAE5}" type="datetimeFigureOut">
               <a:rPr lang="pl-PL" smtClean="0"/>
-              <a:t>18.10.2021</a:t>
+              <a:t>2022-11-07</a:t>
             </a:fld>
             <a:endParaRPr lang="pl-PL"/>
           </a:p>
@@ -673,7 +674,7 @@
           <a:p>
             <a:fld id="{1AB43056-9730-4112-977B-C540BEC2CAE5}" type="datetimeFigureOut">
               <a:rPr lang="pl-PL" smtClean="0"/>
-              <a:t>18.10.2021</a:t>
+              <a:t>2022-11-07</a:t>
             </a:fld>
             <a:endParaRPr lang="pl-PL"/>
           </a:p>
@@ -873,7 +874,7 @@
           <a:p>
             <a:fld id="{1AB43056-9730-4112-977B-C540BEC2CAE5}" type="datetimeFigureOut">
               <a:rPr lang="pl-PL" smtClean="0"/>
-              <a:t>18.10.2021</a:t>
+              <a:t>2022-11-07</a:t>
             </a:fld>
             <a:endParaRPr lang="pl-PL"/>
           </a:p>
@@ -1149,7 +1150,7 @@
           <a:p>
             <a:fld id="{1AB43056-9730-4112-977B-C540BEC2CAE5}" type="datetimeFigureOut">
               <a:rPr lang="pl-PL" smtClean="0"/>
-              <a:t>18.10.2021</a:t>
+              <a:t>2022-11-07</a:t>
             </a:fld>
             <a:endParaRPr lang="pl-PL"/>
           </a:p>
@@ -1417,7 +1418,7 @@
           <a:p>
             <a:fld id="{1AB43056-9730-4112-977B-C540BEC2CAE5}" type="datetimeFigureOut">
               <a:rPr lang="pl-PL" smtClean="0"/>
-              <a:t>18.10.2021</a:t>
+              <a:t>2022-11-07</a:t>
             </a:fld>
             <a:endParaRPr lang="pl-PL"/>
           </a:p>
@@ -1832,7 +1833,7 @@
           <a:p>
             <a:fld id="{1AB43056-9730-4112-977B-C540BEC2CAE5}" type="datetimeFigureOut">
               <a:rPr lang="pl-PL" smtClean="0"/>
-              <a:t>18.10.2021</a:t>
+              <a:t>2022-11-07</a:t>
             </a:fld>
             <a:endParaRPr lang="pl-PL"/>
           </a:p>
@@ -1974,7 +1975,7 @@
           <a:p>
             <a:fld id="{1AB43056-9730-4112-977B-C540BEC2CAE5}" type="datetimeFigureOut">
               <a:rPr lang="pl-PL" smtClean="0"/>
-              <a:t>18.10.2021</a:t>
+              <a:t>2022-11-07</a:t>
             </a:fld>
             <a:endParaRPr lang="pl-PL"/>
           </a:p>
@@ -2087,7 +2088,7 @@
           <a:p>
             <a:fld id="{1AB43056-9730-4112-977B-C540BEC2CAE5}" type="datetimeFigureOut">
               <a:rPr lang="pl-PL" smtClean="0"/>
-              <a:t>18.10.2021</a:t>
+              <a:t>2022-11-07</a:t>
             </a:fld>
             <a:endParaRPr lang="pl-PL"/>
           </a:p>
@@ -2400,7 +2401,7 @@
           <a:p>
             <a:fld id="{1AB43056-9730-4112-977B-C540BEC2CAE5}" type="datetimeFigureOut">
               <a:rPr lang="pl-PL" smtClean="0"/>
-              <a:t>18.10.2021</a:t>
+              <a:t>2022-11-07</a:t>
             </a:fld>
             <a:endParaRPr lang="pl-PL"/>
           </a:p>
@@ -2689,7 +2690,7 @@
           <a:p>
             <a:fld id="{1AB43056-9730-4112-977B-C540BEC2CAE5}" type="datetimeFigureOut">
               <a:rPr lang="pl-PL" smtClean="0"/>
-              <a:t>18.10.2021</a:t>
+              <a:t>2022-11-07</a:t>
             </a:fld>
             <a:endParaRPr lang="pl-PL"/>
           </a:p>
@@ -2932,7 +2933,7 @@
           <a:p>
             <a:fld id="{1AB43056-9730-4112-977B-C540BEC2CAE5}" type="datetimeFigureOut">
               <a:rPr lang="pl-PL" smtClean="0"/>
-              <a:t>18.10.2021</a:t>
+              <a:t>2022-11-07</a:t>
             </a:fld>
             <a:endParaRPr lang="pl-PL"/>
           </a:p>
@@ -3335,6 +3336,113 @@
 <file path=ppt/slides/slide1.xml><?xml version="1.0" encoding="utf-8"?>
 <p:sld xmlns:a="http://schemas.openxmlformats.org/drawingml/2006/main" xmlns:r="http://schemas.openxmlformats.org/officeDocument/2006/relationships" xmlns:p="http://schemas.openxmlformats.org/presentationml/2006/main">
   <p:cSld>
+    <p:spTree>
+      <p:nvGrpSpPr>
+        <p:cNvPr id="1" name=""/>
+        <p:cNvGrpSpPr/>
+        <p:nvPr/>
+      </p:nvGrpSpPr>
+      <p:grpSpPr>
+        <a:xfrm>
+          <a:off x="0" y="0"/>
+          <a:ext cx="0" cy="0"/>
+          <a:chOff x="0" y="0"/>
+          <a:chExt cx="0" cy="0"/>
+        </a:xfrm>
+      </p:grpSpPr>
+      <p:sp>
+        <p:nvSpPr>
+          <p:cNvPr id="2" name="Title 1"/>
+          <p:cNvSpPr>
+            <a:spLocks noGrp="1"/>
+          </p:cNvSpPr>
+          <p:nvPr>
+            <p:ph type="title"/>
+          </p:nvPr>
+        </p:nvSpPr>
+        <p:spPr/>
+        <p:txBody>
+          <a:bodyPr/>
+          <a:lstStyle/>
+          <a:p>
+            <a:r>
+              <a:rPr lang="en-US" dirty="0" smtClean="0"/>
+              <a:t>4 cách chèn bảng</a:t>
+            </a:r>
+            <a:endParaRPr lang="en-US" dirty="0"/>
+          </a:p>
+        </p:txBody>
+      </p:sp>
+      <p:sp>
+        <p:nvSpPr>
+          <p:cNvPr id="3" name="Content Placeholder 2"/>
+          <p:cNvSpPr>
+            <a:spLocks noGrp="1"/>
+          </p:cNvSpPr>
+          <p:nvPr>
+            <p:ph idx="1"/>
+          </p:nvPr>
+        </p:nvSpPr>
+        <p:spPr/>
+        <p:txBody>
+          <a:bodyPr/>
+          <a:lstStyle/>
+          <a:p>
+            <a:r>
+              <a:rPr lang="en-US" dirty="0" smtClean="0"/>
+              <a:t>Insert –&gt; Table</a:t>
+            </a:r>
+          </a:p>
+          <a:p>
+            <a:r>
+              <a:rPr lang="en-US" dirty="0" smtClean="0"/>
+              <a:t>Copy từ trong excel paste trong powerpoint</a:t>
+            </a:r>
+          </a:p>
+          <a:p>
+            <a:r>
+              <a:rPr lang="en-US" dirty="0"/>
+              <a:t>Insert –&gt; Object: </a:t>
+            </a:r>
+            <a:r>
+              <a:rPr lang="en-US" dirty="0">
+                <a:hlinkClick r:id="rId2"/>
+              </a:rPr>
+              <a:t>https://support.microsoft.com/en-us/office/insert-excel-data-in-powerpoint-0690708a-5ce6-41b4-923f-11d57554138d#:~:</a:t>
+            </a:r>
+            <a:r>
+              <a:rPr lang="en-US" dirty="0" smtClean="0">
+                <a:hlinkClick r:id="rId2"/>
+              </a:rPr>
+              <a:t>text=Link%20an%20entire%20Excel%20worksheet%20to%20PowerPoint</a:t>
+            </a:r>
+            <a:endParaRPr lang="en-US" dirty="0" smtClean="0"/>
+          </a:p>
+          <a:p>
+            <a:r>
+              <a:rPr lang="en-US" smtClean="0"/>
+              <a:t>Tạo bảng từ đầu.</a:t>
+            </a:r>
+            <a:endParaRPr lang="en-US" dirty="0" smtClean="0"/>
+          </a:p>
+        </p:txBody>
+      </p:sp>
+    </p:spTree>
+    <p:extLst>
+      <p:ext uri="{BB962C8B-B14F-4D97-AF65-F5344CB8AC3E}">
+        <p14:creationId xmlns:p14="http://schemas.microsoft.com/office/powerpoint/2010/main" val="649824060"/>
+      </p:ext>
+    </p:extLst>
+  </p:cSld>
+  <p:clrMapOvr>
+    <a:masterClrMapping/>
+  </p:clrMapOvr>
+</p:sld>
+</file>
+
+<file path=ppt/slides/slide2.xml><?xml version="1.0" encoding="utf-8"?>
+<p:sld xmlns:a="http://schemas.openxmlformats.org/drawingml/2006/main" xmlns:r="http://schemas.openxmlformats.org/officeDocument/2006/relationships" xmlns:p="http://schemas.openxmlformats.org/presentationml/2006/main">
+  <p:cSld>
     <p:bg>
       <p:bgPr>
         <a:solidFill>
@@ -6137,7 +6245,7 @@
 </p:sld>
 </file>
 
-<file path=ppt/slides/slide2.xml><?xml version="1.0" encoding="utf-8"?>
+<file path=ppt/slides/slide3.xml><?xml version="1.0" encoding="utf-8"?>
 <p:sld xmlns:a="http://schemas.openxmlformats.org/drawingml/2006/main" xmlns:r="http://schemas.openxmlformats.org/officeDocument/2006/relationships" xmlns:p="http://schemas.openxmlformats.org/presentationml/2006/main">
   <p:cSld>
     <p:bg>
@@ -8572,7 +8680,7 @@
 </p:sld>
 </file>
 
-<file path=ppt/slides/slide3.xml><?xml version="1.0" encoding="utf-8"?>
+<file path=ppt/slides/slide4.xml><?xml version="1.0" encoding="utf-8"?>
 <p:sld xmlns:a="http://schemas.openxmlformats.org/drawingml/2006/main" xmlns:r="http://schemas.openxmlformats.org/officeDocument/2006/relationships" xmlns:p="http://schemas.openxmlformats.org/presentationml/2006/main">
   <p:cSld>
     <p:bg>

</xml_diff>

<commit_message>
Commit ngày 8/11/2022 lần 1
</commit_message>
<xml_diff>
--- a/Section 11 - Tables in PowerPoint/TABLES Section (Design).pptx
+++ b/Section 11 - Tables in PowerPoint/TABLES Section (Design).pptx
@@ -5,10 +5,9 @@
     <p:sldMasterId id="2147483648" r:id="rId1"/>
   </p:sldMasterIdLst>
   <p:sldIdLst>
-    <p:sldId id="273" r:id="rId2"/>
-    <p:sldId id="259" r:id="rId3"/>
-    <p:sldId id="272" r:id="rId4"/>
-    <p:sldId id="271" r:id="rId5"/>
+    <p:sldId id="259" r:id="rId2"/>
+    <p:sldId id="272" r:id="rId3"/>
+    <p:sldId id="271" r:id="rId4"/>
   </p:sldIdLst>
   <p:sldSz cx="12192000" cy="6858000"/>
   <p:notesSz cx="6858000" cy="9144000"/>
@@ -264,7 +263,7 @@
           <a:p>
             <a:fld id="{1AB43056-9730-4112-977B-C540BEC2CAE5}" type="datetimeFigureOut">
               <a:rPr lang="pl-PL" smtClean="0"/>
-              <a:t>2022-11-07</a:t>
+              <a:t>2022-11-08</a:t>
             </a:fld>
             <a:endParaRPr lang="pl-PL"/>
           </a:p>
@@ -464,7 +463,7 @@
           <a:p>
             <a:fld id="{1AB43056-9730-4112-977B-C540BEC2CAE5}" type="datetimeFigureOut">
               <a:rPr lang="pl-PL" smtClean="0"/>
-              <a:t>2022-11-07</a:t>
+              <a:t>2022-11-08</a:t>
             </a:fld>
             <a:endParaRPr lang="pl-PL"/>
           </a:p>
@@ -674,7 +673,7 @@
           <a:p>
             <a:fld id="{1AB43056-9730-4112-977B-C540BEC2CAE5}" type="datetimeFigureOut">
               <a:rPr lang="pl-PL" smtClean="0"/>
-              <a:t>2022-11-07</a:t>
+              <a:t>2022-11-08</a:t>
             </a:fld>
             <a:endParaRPr lang="pl-PL"/>
           </a:p>
@@ -874,7 +873,7 @@
           <a:p>
             <a:fld id="{1AB43056-9730-4112-977B-C540BEC2CAE5}" type="datetimeFigureOut">
               <a:rPr lang="pl-PL" smtClean="0"/>
-              <a:t>2022-11-07</a:t>
+              <a:t>2022-11-08</a:t>
             </a:fld>
             <a:endParaRPr lang="pl-PL"/>
           </a:p>
@@ -1150,7 +1149,7 @@
           <a:p>
             <a:fld id="{1AB43056-9730-4112-977B-C540BEC2CAE5}" type="datetimeFigureOut">
               <a:rPr lang="pl-PL" smtClean="0"/>
-              <a:t>2022-11-07</a:t>
+              <a:t>2022-11-08</a:t>
             </a:fld>
             <a:endParaRPr lang="pl-PL"/>
           </a:p>
@@ -1418,7 +1417,7 @@
           <a:p>
             <a:fld id="{1AB43056-9730-4112-977B-C540BEC2CAE5}" type="datetimeFigureOut">
               <a:rPr lang="pl-PL" smtClean="0"/>
-              <a:t>2022-11-07</a:t>
+              <a:t>2022-11-08</a:t>
             </a:fld>
             <a:endParaRPr lang="pl-PL"/>
           </a:p>
@@ -1833,7 +1832,7 @@
           <a:p>
             <a:fld id="{1AB43056-9730-4112-977B-C540BEC2CAE5}" type="datetimeFigureOut">
               <a:rPr lang="pl-PL" smtClean="0"/>
-              <a:t>2022-11-07</a:t>
+              <a:t>2022-11-08</a:t>
             </a:fld>
             <a:endParaRPr lang="pl-PL"/>
           </a:p>
@@ -1975,7 +1974,7 @@
           <a:p>
             <a:fld id="{1AB43056-9730-4112-977B-C540BEC2CAE5}" type="datetimeFigureOut">
               <a:rPr lang="pl-PL" smtClean="0"/>
-              <a:t>2022-11-07</a:t>
+              <a:t>2022-11-08</a:t>
             </a:fld>
             <a:endParaRPr lang="pl-PL"/>
           </a:p>
@@ -2088,7 +2087,7 @@
           <a:p>
             <a:fld id="{1AB43056-9730-4112-977B-C540BEC2CAE5}" type="datetimeFigureOut">
               <a:rPr lang="pl-PL" smtClean="0"/>
-              <a:t>2022-11-07</a:t>
+              <a:t>2022-11-08</a:t>
             </a:fld>
             <a:endParaRPr lang="pl-PL"/>
           </a:p>
@@ -2401,7 +2400,7 @@
           <a:p>
             <a:fld id="{1AB43056-9730-4112-977B-C540BEC2CAE5}" type="datetimeFigureOut">
               <a:rPr lang="pl-PL" smtClean="0"/>
-              <a:t>2022-11-07</a:t>
+              <a:t>2022-11-08</a:t>
             </a:fld>
             <a:endParaRPr lang="pl-PL"/>
           </a:p>
@@ -2690,7 +2689,7 @@
           <a:p>
             <a:fld id="{1AB43056-9730-4112-977B-C540BEC2CAE5}" type="datetimeFigureOut">
               <a:rPr lang="pl-PL" smtClean="0"/>
-              <a:t>2022-11-07</a:t>
+              <a:t>2022-11-08</a:t>
             </a:fld>
             <a:endParaRPr lang="pl-PL"/>
           </a:p>
@@ -2933,7 +2932,7 @@
           <a:p>
             <a:fld id="{1AB43056-9730-4112-977B-C540BEC2CAE5}" type="datetimeFigureOut">
               <a:rPr lang="pl-PL" smtClean="0"/>
-              <a:t>2022-11-07</a:t>
+              <a:t>2022-11-08</a:t>
             </a:fld>
             <a:endParaRPr lang="pl-PL"/>
           </a:p>
@@ -3334,113 +3333,6 @@
 </file>
 
 <file path=ppt/slides/slide1.xml><?xml version="1.0" encoding="utf-8"?>
-<p:sld xmlns:a="http://schemas.openxmlformats.org/drawingml/2006/main" xmlns:r="http://schemas.openxmlformats.org/officeDocument/2006/relationships" xmlns:p="http://schemas.openxmlformats.org/presentationml/2006/main">
-  <p:cSld>
-    <p:spTree>
-      <p:nvGrpSpPr>
-        <p:cNvPr id="1" name=""/>
-        <p:cNvGrpSpPr/>
-        <p:nvPr/>
-      </p:nvGrpSpPr>
-      <p:grpSpPr>
-        <a:xfrm>
-          <a:off x="0" y="0"/>
-          <a:ext cx="0" cy="0"/>
-          <a:chOff x="0" y="0"/>
-          <a:chExt cx="0" cy="0"/>
-        </a:xfrm>
-      </p:grpSpPr>
-      <p:sp>
-        <p:nvSpPr>
-          <p:cNvPr id="2" name="Title 1"/>
-          <p:cNvSpPr>
-            <a:spLocks noGrp="1"/>
-          </p:cNvSpPr>
-          <p:nvPr>
-            <p:ph type="title"/>
-          </p:nvPr>
-        </p:nvSpPr>
-        <p:spPr/>
-        <p:txBody>
-          <a:bodyPr/>
-          <a:lstStyle/>
-          <a:p>
-            <a:r>
-              <a:rPr lang="en-US" dirty="0" smtClean="0"/>
-              <a:t>4 cách chèn bảng</a:t>
-            </a:r>
-            <a:endParaRPr lang="en-US" dirty="0"/>
-          </a:p>
-        </p:txBody>
-      </p:sp>
-      <p:sp>
-        <p:nvSpPr>
-          <p:cNvPr id="3" name="Content Placeholder 2"/>
-          <p:cNvSpPr>
-            <a:spLocks noGrp="1"/>
-          </p:cNvSpPr>
-          <p:nvPr>
-            <p:ph idx="1"/>
-          </p:nvPr>
-        </p:nvSpPr>
-        <p:spPr/>
-        <p:txBody>
-          <a:bodyPr/>
-          <a:lstStyle/>
-          <a:p>
-            <a:r>
-              <a:rPr lang="en-US" dirty="0" smtClean="0"/>
-              <a:t>Insert –&gt; Table</a:t>
-            </a:r>
-          </a:p>
-          <a:p>
-            <a:r>
-              <a:rPr lang="en-US" dirty="0" smtClean="0"/>
-              <a:t>Copy từ trong excel paste trong powerpoint</a:t>
-            </a:r>
-          </a:p>
-          <a:p>
-            <a:r>
-              <a:rPr lang="en-US" dirty="0"/>
-              <a:t>Insert –&gt; Object: </a:t>
-            </a:r>
-            <a:r>
-              <a:rPr lang="en-US" dirty="0">
-                <a:hlinkClick r:id="rId2"/>
-              </a:rPr>
-              <a:t>https://support.microsoft.com/en-us/office/insert-excel-data-in-powerpoint-0690708a-5ce6-41b4-923f-11d57554138d#:~:</a:t>
-            </a:r>
-            <a:r>
-              <a:rPr lang="en-US" dirty="0" smtClean="0">
-                <a:hlinkClick r:id="rId2"/>
-              </a:rPr>
-              <a:t>text=Link%20an%20entire%20Excel%20worksheet%20to%20PowerPoint</a:t>
-            </a:r>
-            <a:endParaRPr lang="en-US" dirty="0" smtClean="0"/>
-          </a:p>
-          <a:p>
-            <a:r>
-              <a:rPr lang="en-US" smtClean="0"/>
-              <a:t>Tạo bảng từ đầu.</a:t>
-            </a:r>
-            <a:endParaRPr lang="en-US" dirty="0" smtClean="0"/>
-          </a:p>
-        </p:txBody>
-      </p:sp>
-    </p:spTree>
-    <p:extLst>
-      <p:ext uri="{BB962C8B-B14F-4D97-AF65-F5344CB8AC3E}">
-        <p14:creationId xmlns:p14="http://schemas.microsoft.com/office/powerpoint/2010/main" val="649824060"/>
-      </p:ext>
-    </p:extLst>
-  </p:cSld>
-  <p:clrMapOvr>
-    <a:masterClrMapping/>
-  </p:clrMapOvr>
-</p:sld>
-</file>
-
-<file path=ppt/slides/slide2.xml><?xml version="1.0" encoding="utf-8"?>
 <p:sld xmlns:a="http://schemas.openxmlformats.org/drawingml/2006/main" xmlns:r="http://schemas.openxmlformats.org/officeDocument/2006/relationships" xmlns:p="http://schemas.openxmlformats.org/presentationml/2006/main">
   <p:cSld>
     <p:bg>
@@ -6245,7 +6137,7 @@
 </p:sld>
 </file>
 
-<file path=ppt/slides/slide3.xml><?xml version="1.0" encoding="utf-8"?>
+<file path=ppt/slides/slide2.xml><?xml version="1.0" encoding="utf-8"?>
 <p:sld xmlns:a="http://schemas.openxmlformats.org/drawingml/2006/main" xmlns:r="http://schemas.openxmlformats.org/officeDocument/2006/relationships" xmlns:p="http://schemas.openxmlformats.org/presentationml/2006/main">
   <p:cSld>
     <p:bg>
@@ -8680,7 +8572,7 @@
 </p:sld>
 </file>
 
-<file path=ppt/slides/slide4.xml><?xml version="1.0" encoding="utf-8"?>
+<file path=ppt/slides/slide3.xml><?xml version="1.0" encoding="utf-8"?>
 <p:sld xmlns:a="http://schemas.openxmlformats.org/drawingml/2006/main" xmlns:r="http://schemas.openxmlformats.org/officeDocument/2006/relationships" xmlns:p="http://schemas.openxmlformats.org/presentationml/2006/main">
   <p:cSld>
     <p:bg>

</xml_diff>